<commit_message>
Updates for Spring 2026.
</commit_message>
<xml_diff>
--- a/lectures/introduction-internship.pptx
+++ b/lectures/introduction-internship.pptx
@@ -381,7 +381,7 @@
             <a:fld id="{8AD1700A-0812-4960-BDAF-BBEBDA6F415D}" type="datetime1">
               <a:rPr lang="en-US" altLang="en-US"/>
               <a:pPr/>
-              <a:t>8/29/2025</a:t>
+              <a:t>1/15/26</a:t>
             </a:fld>
             <a:endParaRPr lang="en-US" altLang="en-US"/>
           </a:p>
@@ -663,7 +663,7 @@
           </a:ln>
           <a:extLst>
             <a:ext uri="{909E8E84-426E-40dd-AFC4-6F175D3DCCD1}">
-              <a14:hiddenFill xmlns:a14="http://schemas.microsoft.com/office/drawing/2010/main" xmlns="">
+              <a14:hiddenFill xmlns="" xmlns:a14="http://schemas.microsoft.com/office/drawing/2010/main">
                 <a:solidFill>
                   <a:srgbClr val="FFFFFF"/>
                 </a:solidFill>
@@ -1048,14 +1048,14 @@
           <a:ln/>
           <a:extLst>
             <a:ext uri="{909E8E84-426E-40dd-AFC4-6F175D3DCCD1}">
-              <a14:hiddenFill xmlns:a14="http://schemas.microsoft.com/office/drawing/2010/main" xmlns="">
+              <a14:hiddenFill xmlns="" xmlns:a14="http://schemas.microsoft.com/office/drawing/2010/main">
                 <a:solidFill>
                   <a:srgbClr val="FFFFFF"/>
                 </a:solidFill>
               </a14:hiddenFill>
             </a:ext>
             <a:ext uri="{91240B29-F687-4f45-9708-019B960494DF}">
-              <a14:hiddenLine xmlns:a14="http://schemas.microsoft.com/office/drawing/2010/main" xmlns="" w="9525">
+              <a14:hiddenLine xmlns="" xmlns:a14="http://schemas.microsoft.com/office/drawing/2010/main" w="9525">
                 <a:solidFill>
                   <a:srgbClr val="000000"/>
                 </a:solidFill>
@@ -1097,14 +1097,14 @@
           <a:ln/>
           <a:extLst>
             <a:ext uri="{909E8E84-426E-40dd-AFC4-6F175D3DCCD1}">
-              <a14:hiddenFill xmlns:a14="http://schemas.microsoft.com/office/drawing/2010/main" xmlns="">
+              <a14:hiddenFill xmlns="" xmlns:a14="http://schemas.microsoft.com/office/drawing/2010/main">
                 <a:solidFill>
                   <a:srgbClr val="FFFFFF"/>
                 </a:solidFill>
               </a14:hiddenFill>
             </a:ext>
             <a:ext uri="{91240B29-F687-4f45-9708-019B960494DF}">
-              <a14:hiddenLine xmlns:a14="http://schemas.microsoft.com/office/drawing/2010/main" xmlns="" w="9525">
+              <a14:hiddenLine xmlns="" xmlns:a14="http://schemas.microsoft.com/office/drawing/2010/main" w="9525">
                 <a:solidFill>
                   <a:srgbClr val="000000"/>
                 </a:solidFill>
@@ -1305,7 +1305,7 @@
           </a:ln>
           <a:extLst>
             <a:ext uri="{91240B29-F687-4f45-9708-019B960494DF}">
-              <a14:hiddenLine xmlns:a14="http://schemas.microsoft.com/office/drawing/2010/main" xmlns="" w="9525">
+              <a14:hiddenLine xmlns="" xmlns:a14="http://schemas.microsoft.com/office/drawing/2010/main" w="9525">
                 <a:solidFill>
                   <a:srgbClr val="000000"/>
                 </a:solidFill>
@@ -1471,14 +1471,14 @@
           </a:ln>
           <a:extLst>
             <a:ext uri="{909E8E84-426E-40dd-AFC4-6F175D3DCCD1}">
-              <a14:hiddenFill xmlns:a14="http://schemas.microsoft.com/office/drawing/2010/main" xmlns="">
+              <a14:hiddenFill xmlns="" xmlns:a14="http://schemas.microsoft.com/office/drawing/2010/main">
                 <a:solidFill>
                   <a:srgbClr val="FFFFFF"/>
                 </a:solidFill>
               </a14:hiddenFill>
             </a:ext>
             <a:ext uri="{91240B29-F687-4f45-9708-019B960494DF}">
-              <a14:hiddenLine xmlns:a14="http://schemas.microsoft.com/office/drawing/2010/main" xmlns="" w="9525">
+              <a14:hiddenLine xmlns="" xmlns:a14="http://schemas.microsoft.com/office/drawing/2010/main" w="9525">
                 <a:solidFill>
                   <a:srgbClr val="000000"/>
                 </a:solidFill>
@@ -3712,7 +3712,7 @@
             </a:ln>
             <a:extLst>
               <a:ext uri="{91240B29-F687-4f45-9708-019B960494DF}">
-                <a14:hiddenLine xmlns:a14="http://schemas.microsoft.com/office/drawing/2010/main" xmlns="" w="9525">
+                <a14:hiddenLine xmlns="" xmlns:a14="http://schemas.microsoft.com/office/drawing/2010/main" w="9525">
                   <a:solidFill>
                     <a:srgbClr val="000000"/>
                   </a:solidFill>
@@ -3875,7 +3875,7 @@
             </a:ln>
             <a:extLst>
               <a:ext uri="{91240B29-F687-4f45-9708-019B960494DF}">
-                <a14:hiddenLine xmlns:a14="http://schemas.microsoft.com/office/drawing/2010/main" xmlns="" w="9525">
+                <a14:hiddenLine xmlns="" xmlns:a14="http://schemas.microsoft.com/office/drawing/2010/main" w="9525">
                   <a:solidFill>
                     <a:srgbClr val="000000"/>
                   </a:solidFill>
@@ -4031,14 +4031,14 @@
           </a:ln>
           <a:extLst>
             <a:ext uri="{909E8E84-426E-40dd-AFC4-6F175D3DCCD1}">
-              <a14:hiddenFill xmlns:a14="http://schemas.microsoft.com/office/drawing/2010/main" xmlns="">
+              <a14:hiddenFill xmlns="" xmlns:a14="http://schemas.microsoft.com/office/drawing/2010/main">
                 <a:solidFill>
                   <a:srgbClr val="FFFFFF"/>
                 </a:solidFill>
               </a14:hiddenFill>
             </a:ext>
             <a:ext uri="{91240B29-F687-4f45-9708-019B960494DF}">
-              <a14:hiddenLine xmlns:a14="http://schemas.microsoft.com/office/drawing/2010/main" xmlns="" w="9525">
+              <a14:hiddenLine xmlns="" xmlns:a14="http://schemas.microsoft.com/office/drawing/2010/main" w="9525">
                 <a:solidFill>
                   <a:srgbClr val="000000"/>
                 </a:solidFill>
@@ -4095,14 +4095,14 @@
           </a:ln>
           <a:extLst>
             <a:ext uri="{909E8E84-426E-40dd-AFC4-6F175D3DCCD1}">
-              <a14:hiddenFill xmlns:a14="http://schemas.microsoft.com/office/drawing/2010/main" xmlns="">
+              <a14:hiddenFill xmlns="" xmlns:a14="http://schemas.microsoft.com/office/drawing/2010/main">
                 <a:solidFill>
                   <a:srgbClr val="FFFFFF"/>
                 </a:solidFill>
               </a14:hiddenFill>
             </a:ext>
             <a:ext uri="{91240B29-F687-4f45-9708-019B960494DF}">
-              <a14:hiddenLine xmlns:a14="http://schemas.microsoft.com/office/drawing/2010/main" xmlns="" w="9525">
+              <a14:hiddenLine xmlns="" xmlns:a14="http://schemas.microsoft.com/office/drawing/2010/main" w="9525">
                 <a:solidFill>
                   <a:srgbClr val="000000"/>
                 </a:solidFill>
@@ -4198,14 +4198,14 @@
           </a:ln>
           <a:extLst>
             <a:ext uri="{909E8E84-426E-40dd-AFC4-6F175D3DCCD1}">
-              <a14:hiddenFill xmlns:a14="http://schemas.microsoft.com/office/drawing/2010/main" xmlns="">
+              <a14:hiddenFill xmlns="" xmlns:a14="http://schemas.microsoft.com/office/drawing/2010/main">
                 <a:solidFill>
                   <a:srgbClr val="FFFFFF"/>
                 </a:solidFill>
               </a14:hiddenFill>
             </a:ext>
             <a:ext uri="{91240B29-F687-4f45-9708-019B960494DF}">
-              <a14:hiddenLine xmlns:a14="http://schemas.microsoft.com/office/drawing/2010/main" xmlns="" w="9525">
+              <a14:hiddenLine xmlns="" xmlns:a14="http://schemas.microsoft.com/office/drawing/2010/main" w="9525">
                 <a:solidFill>
                   <a:srgbClr val="000000"/>
                 </a:solidFill>
@@ -4777,14 +4777,14 @@
           </a:ln>
           <a:extLst>
             <a:ext uri="{909E8E84-426E-40dd-AFC4-6F175D3DCCD1}">
-              <a14:hiddenFill xmlns:a14="http://schemas.microsoft.com/office/drawing/2010/main" xmlns="">
+              <a14:hiddenFill xmlns="" xmlns:a14="http://schemas.microsoft.com/office/drawing/2010/main">
                 <a:solidFill>
                   <a:srgbClr val="FFFFFF"/>
                 </a:solidFill>
               </a14:hiddenFill>
             </a:ext>
             <a:ext uri="{91240B29-F687-4f45-9708-019B960494DF}">
-              <a14:hiddenLine xmlns:a14="http://schemas.microsoft.com/office/drawing/2010/main" xmlns="" w="9525">
+              <a14:hiddenLine xmlns="" xmlns:a14="http://schemas.microsoft.com/office/drawing/2010/main" w="9525">
                 <a:solidFill>
                   <a:srgbClr val="000000"/>
                 </a:solidFill>
@@ -4907,14 +4907,14 @@
           </a:ln>
           <a:extLst>
             <a:ext uri="{909E8E84-426E-40dd-AFC4-6F175D3DCCD1}">
-              <a14:hiddenFill xmlns:a14="http://schemas.microsoft.com/office/drawing/2010/main" xmlns="">
+              <a14:hiddenFill xmlns="" xmlns:a14="http://schemas.microsoft.com/office/drawing/2010/main">
                 <a:solidFill>
                   <a:srgbClr val="FFFFFF"/>
                 </a:solidFill>
               </a14:hiddenFill>
             </a:ext>
             <a:ext uri="{91240B29-F687-4f45-9708-019B960494DF}">
-              <a14:hiddenLine xmlns:a14="http://schemas.microsoft.com/office/drawing/2010/main" xmlns="" w="9525">
+              <a14:hiddenLine xmlns="" xmlns:a14="http://schemas.microsoft.com/office/drawing/2010/main" w="9525">
                 <a:solidFill>
                   <a:srgbClr val="000000"/>
                 </a:solidFill>
@@ -6040,13 +6040,13 @@
               <a:t>Please refer to course webpage for details:</a:t>
             </a:r>
             <a:br>
-              <a:rPr lang="en-US" dirty="0"/>
+              <a:rPr lang="en-US" sz="2000" dirty="0"/>
             </a:br>
             <a:r>
               <a:rPr lang="en-US" sz="2000" dirty="0">
                 <a:hlinkClick r:id="rId2"/>
               </a:rPr>
-              <a:t>https://wonsunahn.github.io/Capstone_Fall2025/CS1900_1950/</a:t>
+              <a:t>https://wonsunahn.github.io/Capstone_Spring2026/CS1900_1950/</a:t>
             </a:r>
             <a:br>
               <a:rPr lang="en-US" sz="2000" dirty="0"/>
@@ -6215,13 +6215,13 @@
               <a:t>There is a link to a template (and more) on this URL:</a:t>
             </a:r>
             <a:br>
-              <a:rPr lang="en-US" dirty="0"/>
+              <a:rPr lang="en-US" sz="2000" dirty="0"/>
             </a:br>
             <a:r>
               <a:rPr lang="en-US" sz="2000" dirty="0">
                 <a:hlinkClick r:id="rId2"/>
               </a:rPr>
-              <a:t>https://wonsunahn.github.io/Capstone_Fall2025/final_paper</a:t>
+              <a:t>https://wonsunahn.github.io/Capstone_Spring2026/final_paper</a:t>
             </a:r>
             <a:br>
               <a:rPr lang="en-US" sz="2000" dirty="0"/>
@@ -6955,7 +6955,7 @@
           <a:p>
             <a:r>
               <a:rPr lang="en-US" altLang="en-US" dirty="0"/>
-              <a:t>~5 talks per day. 50 / 5 = 10 minutes per talk.</a:t>
+              <a:t>One talk per day (as it stands now)</a:t>
             </a:r>
           </a:p>
           <a:p>
@@ -6964,14 +6964,14 @@
           <a:p>
             <a:r>
               <a:rPr lang="en-US" altLang="en-US" dirty="0"/>
-              <a:t>5 minutes: Presentation talk</a:t>
+              <a:t>30 minutes: Presentation talk</a:t>
             </a:r>
           </a:p>
           <a:p>
             <a:pPr lvl="1"/>
             <a:r>
               <a:rPr lang="en-US" altLang="en-US" dirty="0"/>
-              <a:t>Speaker: Present on TopHat using instructor’s laptop</a:t>
+              <a:t>Present on TopHat using instructor’s laptop</a:t>
             </a:r>
             <a:br>
               <a:rPr lang="en-US" altLang="en-US" dirty="0"/>
@@ -6984,20 +6984,14 @@
           <a:p>
             <a:r>
               <a:rPr lang="en-US" altLang="en-US" dirty="0"/>
-              <a:t>3 minutes: Q &amp; A</a:t>
-            </a:r>
-          </a:p>
-          <a:p>
+              <a:t>20 minutes: Q &amp; A</a:t>
+            </a:r>
+          </a:p>
+          <a:p>
+            <a:pPr lvl="1"/>
             <a:r>
               <a:rPr lang="en-US" altLang="en-US" dirty="0"/>
-              <a:t>2 minutes: Intermission</a:t>
-            </a:r>
-          </a:p>
-          <a:p>
-            <a:pPr lvl="1"/>
-            <a:r>
-              <a:rPr lang="en-US" altLang="en-US" dirty="0"/>
-              <a:t>Switch speakers, audience completes peer feedback</a:t>
+              <a:t>Audience completes peer feedback during this time</a:t>
             </a:r>
           </a:p>
           <a:p>
@@ -7019,21 +7013,6 @@
             <a:r>
               <a:rPr lang="en-US" altLang="en-US" dirty="0"/>
               <a:t> using your cell phone</a:t>
-            </a:r>
-          </a:p>
-          <a:p>
-            <a:pPr lvl="1"/>
-            <a:r>
-              <a:rPr lang="en-US" altLang="en-US" dirty="0"/>
-              <a:t>I will cut you off if you go </a:t>
-            </a:r>
-            <a:r>
-              <a:rPr lang="en-US" altLang="en-US"/>
-              <a:t>over 8 </a:t>
-            </a:r>
-            <a:r>
-              <a:rPr lang="en-US" altLang="en-US" dirty="0"/>
-              <a:t>minutes with no warning</a:t>
             </a:r>
           </a:p>
         </p:txBody>

</xml_diff>